<commit_message>
Add Draft of 0129
</commit_message>
<xml_diff>
--- a/Presentation_0129_JiayuChen.pptx
+++ b/Presentation_0129_JiayuChen.pptx
@@ -264,7 +264,7 @@
       <p15:sldGuideLst xmlns:p15="http://schemas.microsoft.com/office/powerpoint/2012/main"/>
     </p:ext>
     <p:ext uri="GoogleSlidesCustomDataVersion2">
-      <go:slidesCustomData xmlns:go="http://customooxmlschemas.google.com/" xmlns:ahyp="http://schemas.microsoft.com/office/drawing/2018/hyperlinkcolor" xmlns:p15="http://schemas.microsoft.com/office/powerpoint/2012/main" xmlns:p14="http://schemas.microsoft.com/office/powerpoint/2010/main" xmlns:com="http://schemas.openxmlformats.org/drawingml/2006/compatibility" xmlns:pvml="urn:schemas-microsoft-com:office:powerpoint" xmlns:v="urn:schemas-microsoft-com:vml" xmlns:o="urn:schemas-microsoft-com:office:office" xmlns:dgm="http://schemas.openxmlformats.org/drawingml/2006/diagram" xmlns:c="http://schemas.openxmlformats.org/drawingml/2006/chart" xmlns:mv="urn:schemas-microsoft-com:mac:vml" xmlns:mc="http://schemas.openxmlformats.org/markup-compatibility/2006" xmlns="" r:id="rId31" roundtripDataSignature="AMtx7mi7AOUiGfioVPTFrFzTi+gJGDXQ/w=="/>
+      <go:slidesCustomData xmlns="" xmlns:mc="http://schemas.openxmlformats.org/markup-compatibility/2006" xmlns:mv="urn:schemas-microsoft-com:mac:vml" xmlns:c="http://schemas.openxmlformats.org/drawingml/2006/chart" xmlns:dgm="http://schemas.openxmlformats.org/drawingml/2006/diagram" xmlns:o="urn:schemas-microsoft-com:office:office" xmlns:v="urn:schemas-microsoft-com:vml" xmlns:pvml="urn:schemas-microsoft-com:office:powerpoint" xmlns:com="http://schemas.openxmlformats.org/drawingml/2006/compatibility" xmlns:p14="http://schemas.microsoft.com/office/powerpoint/2010/main" xmlns:p15="http://schemas.microsoft.com/office/powerpoint/2012/main" xmlns:ahyp="http://schemas.microsoft.com/office/drawing/2018/hyperlinkcolor" xmlns:go="http://customooxmlschemas.google.com/" r:id="rId31" roundtripDataSignature="AMtx7mi7AOUiGfioVPTFrFzTi+gJGDXQ/w=="/>
     </p:ext>
   </p:extLst>
 </p:presentation>
@@ -14096,7 +14096,7 @@
         <p:spPr>
           <a:xfrm>
             <a:off x="1390650" y="4103473"/>
-            <a:ext cx="5686425" cy="1384995"/>
+            <a:ext cx="5686425" cy="1600438"/>
           </a:xfrm>
           <a:prstGeom prst="rect">
             <a:avLst/>
@@ -14111,40 +14111,18 @@
           <a:p>
             <a:r>
               <a:rPr lang="en-US" altLang="zh-CN" dirty="0"/>
-              <a:t>Template-Based IBI Estimation</a:t>
+              <a:t>Template-Based IBI Estimation is not flawless, and the main concern is the similarity between the signals at the connection points and the heartbeat signals.</a:t>
             </a:r>
-            <a:r>
-              <a:rPr lang="zh-CN" altLang="en-US" dirty="0"/>
-              <a:t>并不是完全完美，</a:t>
-            </a:r>
+          </a:p>
+          <a:p>
             <a:endParaRPr lang="en-US" altLang="zh-CN" dirty="0"/>
           </a:p>
           <a:p>
-            <a:r>
-              <a:rPr lang="zh-CN" altLang="en-US" dirty="0"/>
-              <a:t>唯一害怕的就是这种信号连接处信号和心跳信号很接近的。</a:t>
-            </a:r>
-            <a:endParaRPr lang="en-US" altLang="zh-CN" dirty="0"/>
-          </a:p>
-          <a:p>
-            <a:endParaRPr lang="en-US" altLang="zh-CN" dirty="0"/>
-          </a:p>
-          <a:p>
-            <a:endParaRPr lang="en-US" altLang="zh-CN" dirty="0"/>
-          </a:p>
-          <a:p>
-            <a:r>
-              <a:rPr lang="zh-CN" altLang="en-US" dirty="0"/>
-              <a:t>我觉得，你上次给我的思路，大概就是</a:t>
-            </a:r>
             <a:r>
               <a:rPr lang="en-US" altLang="zh-CN" dirty="0"/>
-              <a:t>Fuzzy Matched Filter</a:t>
+              <a:t>The idea you provided about the concept of the Fuzzy Matched Filter, might potentially address this issue if successfully implemented. We should spend more time on it.</a:t>
             </a:r>
-            <a:r>
-              <a:rPr lang="zh-CN" altLang="en-US" dirty="0"/>
-              <a:t>如果真的能够实现，可能能够解决这个问题</a:t>
-            </a:r>
+            <a:endParaRPr lang="zh-CN" altLang="en-US" dirty="0"/>
           </a:p>
         </p:txBody>
       </p:sp>
@@ -15318,6 +15296,41 @@
           </a:prstGeom>
         </p:spPr>
       </p:pic>
+      <p:sp>
+        <p:nvSpPr>
+          <p:cNvPr id="5" name="文本框 4">
+            <a:extLst>
+              <a:ext uri="{FF2B5EF4-FFF2-40B4-BE49-F238E27FC236}">
+                <a16:creationId xmlns:a16="http://schemas.microsoft.com/office/drawing/2014/main" id="{AB4A8A42-8342-0FE2-8485-5BAE7843B286}"/>
+              </a:ext>
+            </a:extLst>
+          </p:cNvPr>
+          <p:cNvSpPr txBox="1"/>
+          <p:nvPr/>
+        </p:nvSpPr>
+        <p:spPr>
+          <a:xfrm>
+            <a:off x="385674" y="493394"/>
+            <a:ext cx="5448300" cy="307777"/>
+          </a:xfrm>
+          <a:prstGeom prst="rect">
+            <a:avLst/>
+          </a:prstGeom>
+          <a:noFill/>
+        </p:spPr>
+        <p:txBody>
+          <a:bodyPr wrap="square" rtlCol="0">
+            <a:spAutoFit/>
+          </a:bodyPr>
+          <a:lstStyle/>
+          <a:p>
+            <a:r>
+              <a:rPr lang="en-US" altLang="zh-CN" dirty="0"/>
+              <a:t>Point_3</a:t>
+            </a:r>
+          </a:p>
+        </p:txBody>
+      </p:sp>
     </p:spTree>
     <p:extLst>
       <p:ext uri="{BB962C8B-B14F-4D97-AF65-F5344CB8AC3E}">
@@ -17215,8 +17228,8 @@
         </p:nvSpPr>
         <p:spPr>
           <a:xfrm>
-            <a:off x="314325" y="666750"/>
-            <a:ext cx="9772650" cy="738664"/>
+            <a:off x="504040" y="798012"/>
+            <a:ext cx="10796019" cy="923330"/>
           </a:xfrm>
           <a:prstGeom prst="rect">
             <a:avLst/>
@@ -17230,20 +17243,24 @@
           <a:lstStyle/>
           <a:p>
             <a:r>
-              <a:rPr lang="en-US" altLang="zh-CN" dirty="0"/>
+              <a:rPr lang="en-US" altLang="zh-CN" sz="1800" dirty="0">
+                <a:solidFill>
+                  <a:schemeClr val="dk1"/>
+                </a:solidFill>
+                <a:latin typeface="Consolas"/>
+              </a:rPr>
               <a:t>After Attempts on More Real data:</a:t>
             </a:r>
           </a:p>
           <a:p>
             <a:r>
-              <a:rPr lang="en-US" altLang="zh-CN" dirty="0"/>
-              <a:t>I’m sure the IBI could be accurately calculated, by applying Matched Filter to the 10 second signal and its template.</a:t>
-            </a:r>
-          </a:p>
-          <a:p>
-            <a:r>
-              <a:rPr lang="en-US" altLang="zh-CN" dirty="0"/>
-              <a:t>If we can first roughly calculate the Heart Rate</a:t>
+              <a:rPr lang="en-US" altLang="zh-CN" sz="1800" dirty="0">
+                <a:solidFill>
+                  <a:schemeClr val="dk1"/>
+                </a:solidFill>
+                <a:latin typeface="Consolas"/>
+              </a:rPr>
+              <a:t>I’m sure the IBI could be accurately calculated, by applying Matched Filter to the 10 second signal and its template. If we can first roughly calculate the Heart Rate.</a:t>
             </a:r>
           </a:p>
         </p:txBody>
@@ -17415,9 +17432,28 @@
           <a:bodyPr wrap="square" rtlCol="0">
             <a:spAutoFit/>
           </a:bodyPr>
-          <a:lstStyle/>
-          <a:p>
-            <a:pPr algn="ctr"/>
+          <a:lstStyle>
+            <a:defPPr marR="0" lvl="0" algn="l" rtl="0">
+              <a:lnSpc>
+                <a:spcPct val="100000"/>
+              </a:lnSpc>
+              <a:spcBef>
+                <a:spcPts val="0"/>
+              </a:spcBef>
+              <a:spcAft>
+                <a:spcPts val="0"/>
+              </a:spcAft>
+            </a:defPPr>
+            <a:lvl1pPr>
+              <a:defRPr sz="1800">
+                <a:solidFill>
+                  <a:schemeClr val="dk1"/>
+                </a:solidFill>
+                <a:latin typeface="Consolas"/>
+              </a:defRPr>
+            </a:lvl1pPr>
+          </a:lstStyle>
+          <a:p>
             <a:r>
               <a:rPr lang="en-US" altLang="zh-CN" dirty="0"/>
               <a:t>Get Template</a:t>
@@ -17451,9 +17487,28 @@
           <a:bodyPr wrap="square" rtlCol="0">
             <a:spAutoFit/>
           </a:bodyPr>
-          <a:lstStyle/>
-          <a:p>
-            <a:pPr algn="ctr"/>
+          <a:lstStyle>
+            <a:defPPr marR="0" lvl="0" algn="l" rtl="0">
+              <a:lnSpc>
+                <a:spcPct val="100000"/>
+              </a:lnSpc>
+              <a:spcBef>
+                <a:spcPts val="0"/>
+              </a:spcBef>
+              <a:spcAft>
+                <a:spcPts val="0"/>
+              </a:spcAft>
+            </a:defPPr>
+            <a:lvl1pPr>
+              <a:defRPr sz="1800">
+                <a:solidFill>
+                  <a:schemeClr val="dk1"/>
+                </a:solidFill>
+                <a:latin typeface="Consolas"/>
+              </a:defRPr>
+            </a:lvl1pPr>
+          </a:lstStyle>
+          <a:p>
             <a:r>
               <a:rPr lang="en-US" altLang="zh-CN" dirty="0"/>
               <a:t>Original Signal</a:t>
@@ -17487,9 +17542,28 @@
           <a:bodyPr wrap="square" rtlCol="0">
             <a:spAutoFit/>
           </a:bodyPr>
-          <a:lstStyle/>
-          <a:p>
-            <a:pPr algn="ctr"/>
+          <a:lstStyle>
+            <a:defPPr marR="0" lvl="0" algn="l" rtl="0">
+              <a:lnSpc>
+                <a:spcPct val="100000"/>
+              </a:lnSpc>
+              <a:spcBef>
+                <a:spcPts val="0"/>
+              </a:spcBef>
+              <a:spcAft>
+                <a:spcPts val="0"/>
+              </a:spcAft>
+            </a:defPPr>
+            <a:lvl1pPr>
+              <a:defRPr sz="1800">
+                <a:solidFill>
+                  <a:schemeClr val="dk1"/>
+                </a:solidFill>
+                <a:latin typeface="Consolas"/>
+              </a:defRPr>
+            </a:lvl1pPr>
+          </a:lstStyle>
+          <a:p>
             <a:r>
               <a:rPr lang="en-US" altLang="zh-CN" dirty="0"/>
               <a:t>Matched Filter</a:t>
@@ -17515,7 +17589,7 @@
         </p:nvCxnSpPr>
         <p:spPr>
           <a:xfrm flipV="1">
-            <a:off x="2638432" y="2684861"/>
+            <a:off x="2638432" y="2854138"/>
             <a:ext cx="1219199" cy="399872"/>
           </a:xfrm>
           <a:prstGeom prst="bentConnector3">
@@ -17557,7 +17631,7 @@
         </p:nvCxnSpPr>
         <p:spPr>
           <a:xfrm>
-            <a:off x="2638431" y="1598058"/>
+            <a:off x="2638431" y="1767335"/>
             <a:ext cx="1219200" cy="1086803"/>
           </a:xfrm>
           <a:prstGeom prst="bentConnector3">
@@ -17608,9 +17682,28 @@
           <a:bodyPr wrap="square" rtlCol="0">
             <a:spAutoFit/>
           </a:bodyPr>
-          <a:lstStyle/>
-          <a:p>
-            <a:pPr algn="ctr"/>
+          <a:lstStyle>
+            <a:defPPr marR="0" lvl="0" algn="l" rtl="0">
+              <a:lnSpc>
+                <a:spcPct val="100000"/>
+              </a:lnSpc>
+              <a:spcBef>
+                <a:spcPts val="0"/>
+              </a:spcBef>
+              <a:spcAft>
+                <a:spcPts val="0"/>
+              </a:spcAft>
+            </a:defPPr>
+            <a:lvl1pPr>
+              <a:defRPr sz="1800">
+                <a:solidFill>
+                  <a:schemeClr val="dk1"/>
+                </a:solidFill>
+                <a:latin typeface="Consolas"/>
+              </a:defRPr>
+            </a:lvl1pPr>
+          </a:lstStyle>
+          <a:p>
             <a:r>
               <a:rPr lang="en-US" altLang="zh-CN" dirty="0"/>
               <a:t>Filtered Signal</a:t>
@@ -17644,9 +17737,28 @@
           <a:bodyPr wrap="square" rtlCol="0">
             <a:spAutoFit/>
           </a:bodyPr>
-          <a:lstStyle/>
-          <a:p>
-            <a:pPr algn="ctr"/>
+          <a:lstStyle>
+            <a:defPPr marR="0" lvl="0" algn="l" rtl="0">
+              <a:lnSpc>
+                <a:spcPct val="100000"/>
+              </a:lnSpc>
+              <a:spcBef>
+                <a:spcPts val="0"/>
+              </a:spcBef>
+              <a:spcAft>
+                <a:spcPts val="0"/>
+              </a:spcAft>
+            </a:defPPr>
+            <a:lvl1pPr>
+              <a:defRPr sz="1800">
+                <a:solidFill>
+                  <a:schemeClr val="dk1"/>
+                </a:solidFill>
+                <a:latin typeface="Consolas"/>
+              </a:defRPr>
+            </a:lvl1pPr>
+          </a:lstStyle>
+          <a:p>
             <a:r>
               <a:rPr lang="en-US" altLang="zh-CN" dirty="0"/>
               <a:t>Rough Heart Rate</a:t>
@@ -17672,7 +17784,7 @@
         </p:nvCxnSpPr>
         <p:spPr>
           <a:xfrm flipV="1">
-            <a:off x="2638431" y="1598057"/>
+            <a:off x="2638431" y="1767334"/>
             <a:ext cx="1743073" cy="1"/>
           </a:xfrm>
           <a:prstGeom prst="bentConnector3">
@@ -17715,7 +17827,7 @@
         </p:nvCxnSpPr>
         <p:spPr>
           <a:xfrm>
-            <a:off x="5410206" y="2684861"/>
+            <a:off x="5410206" y="2854138"/>
             <a:ext cx="347662" cy="0"/>
           </a:xfrm>
           <a:prstGeom prst="straightConnector1">
@@ -17766,7 +17878,27 @@
           <a:bodyPr wrap="square" rtlCol="0">
             <a:spAutoFit/>
           </a:bodyPr>
-          <a:lstStyle/>
+          <a:lstStyle>
+            <a:defPPr marR="0" lvl="0" algn="l" rtl="0">
+              <a:lnSpc>
+                <a:spcPct val="100000"/>
+              </a:lnSpc>
+              <a:spcBef>
+                <a:spcPts val="0"/>
+              </a:spcBef>
+              <a:spcAft>
+                <a:spcPts val="0"/>
+              </a:spcAft>
+            </a:defPPr>
+            <a:lvl1pPr>
+              <a:defRPr sz="1800">
+                <a:solidFill>
+                  <a:schemeClr val="dk1"/>
+                </a:solidFill>
+                <a:latin typeface="Consolas"/>
+              </a:defRPr>
+            </a:lvl1pPr>
+          </a:lstStyle>
           <a:p>
             <a:r>
               <a:rPr lang="en-US" altLang="zh-CN" dirty="0"/>
@@ -17803,12 +17935,12 @@
         </p:nvCxnSpPr>
         <p:spPr>
           <a:xfrm>
-            <a:off x="6091243" y="1598057"/>
-            <a:ext cx="2438403" cy="522417"/>
+            <a:off x="6091243" y="1767334"/>
+            <a:ext cx="2438403" cy="691695"/>
           </a:xfrm>
           <a:prstGeom prst="bentConnector3">
             <a:avLst>
-              <a:gd name="adj1" fmla="val 75000"/>
+              <a:gd name="adj1" fmla="val 50000"/>
             </a:avLst>
           </a:prstGeom>
           <a:ln>
@@ -17848,8 +17980,8 @@
         </p:nvCxnSpPr>
         <p:spPr>
           <a:xfrm flipV="1">
-            <a:off x="7310444" y="2120474"/>
-            <a:ext cx="1219202" cy="564387"/>
+            <a:off x="7310444" y="2459029"/>
+            <a:ext cx="1219202" cy="395109"/>
           </a:xfrm>
           <a:prstGeom prst="bentConnector3">
             <a:avLst>
@@ -17901,7 +18033,27 @@
           <a:bodyPr wrap="square" rtlCol="0">
             <a:spAutoFit/>
           </a:bodyPr>
-          <a:lstStyle/>
+          <a:lstStyle>
+            <a:defPPr marR="0" lvl="0" algn="l" rtl="0">
+              <a:lnSpc>
+                <a:spcPct val="100000"/>
+              </a:lnSpc>
+              <a:spcBef>
+                <a:spcPts val="0"/>
+              </a:spcBef>
+              <a:spcAft>
+                <a:spcPts val="0"/>
+              </a:spcAft>
+            </a:defPPr>
+            <a:lvl1pPr>
+              <a:defRPr sz="1800">
+                <a:solidFill>
+                  <a:schemeClr val="dk1"/>
+                </a:solidFill>
+                <a:latin typeface="Consolas"/>
+              </a:defRPr>
+            </a:lvl1pPr>
+          </a:lstStyle>
           <a:p>
             <a:r>
               <a:rPr lang="en-US" altLang="zh-CN" dirty="0"/>
@@ -17927,9 +18079,9 @@
           <p:nvPr/>
         </p:nvCxnSpPr>
         <p:spPr>
-          <a:xfrm>
-            <a:off x="9648821" y="2120474"/>
-            <a:ext cx="600090" cy="0"/>
+          <a:xfrm flipV="1">
+            <a:off x="9648821" y="2289751"/>
+            <a:ext cx="600090" cy="169278"/>
           </a:xfrm>
           <a:prstGeom prst="straightConnector1">
             <a:avLst/>
@@ -17968,7 +18120,7 @@
         <p:spPr>
           <a:xfrm>
             <a:off x="1081093" y="6286500"/>
-            <a:ext cx="4676775" cy="523220"/>
+            <a:ext cx="4676775" cy="584775"/>
           </a:xfrm>
           <a:prstGeom prst="rect">
             <a:avLst/>
@@ -17979,22 +18131,39 @@
           <a:bodyPr wrap="square" rtlCol="0">
             <a:spAutoFit/>
           </a:bodyPr>
-          <a:lstStyle/>
-          <a:p>
-            <a:pPr marL="285750" indent="-285750">
-              <a:buFont typeface="Arial" panose="020B0604020202020204" pitchFamily="34" charset="0"/>
-              <a:buChar char="•"/>
-            </a:pPr>
+          <a:lstStyle>
+            <a:defPPr marR="0" lvl="0" algn="l" rtl="0">
+              <a:lnSpc>
+                <a:spcPct val="100000"/>
+              </a:lnSpc>
+              <a:spcBef>
+                <a:spcPts val="0"/>
+              </a:spcBef>
+              <a:spcAft>
+                <a:spcPts val="0"/>
+              </a:spcAft>
+              <a:defRPr/>
+            </a:defPPr>
+            <a:lvl1pPr>
+              <a:defRPr sz="1800">
+                <a:solidFill>
+                  <a:schemeClr val="dk1"/>
+                </a:solidFill>
+                <a:latin typeface="Consolas"/>
+              </a:defRPr>
+            </a:lvl1pPr>
+          </a:lstStyle>
+          <a:p>
             <a:r>
-              <a:rPr lang="en-US" altLang="zh-CN" dirty="0"/>
+              <a:rPr lang="en-US" altLang="zh-CN" sz="1600" dirty="0"/>
               <a:t>A easy and useful way for rough heart rate</a:t>
             </a:r>
             <a:r>
-              <a:rPr lang="zh-CN" altLang="en-US" dirty="0"/>
+              <a:rPr lang="zh-CN" altLang="en-US" sz="1600" dirty="0"/>
               <a:t> </a:t>
             </a:r>
             <a:r>
-              <a:rPr lang="en-US" altLang="zh-CN" dirty="0"/>
+              <a:rPr lang="en-US" altLang="zh-CN" sz="1600" dirty="0"/>
               <a:t>will be introduced in next pages</a:t>
             </a:r>
           </a:p>
@@ -18180,33 +18349,44 @@
           <a:noFill/>
         </p:spPr>
         <p:txBody>
-          <a:bodyPr wrap="square">
+          <a:bodyPr wrap="square" rtlCol="0">
             <a:spAutoFit/>
           </a:bodyPr>
-          <a:lstStyle/>
-          <a:p>
-            <a:pPr algn="ctr"/>
+          <a:lstStyle>
+            <a:defPPr marR="0" lvl="0" algn="l" rtl="0">
+              <a:lnSpc>
+                <a:spcPct val="100000"/>
+              </a:lnSpc>
+              <a:spcBef>
+                <a:spcPts val="0"/>
+              </a:spcBef>
+              <a:spcAft>
+                <a:spcPts val="0"/>
+              </a:spcAft>
+            </a:defPPr>
+            <a:lvl1pPr>
+              <a:defRPr sz="1800">
+                <a:solidFill>
+                  <a:schemeClr val="dk1"/>
+                </a:solidFill>
+                <a:latin typeface="Consolas"/>
+              </a:defRPr>
+            </a:lvl1pPr>
+          </a:lstStyle>
+          <a:p>
             <a:r>
-              <a:rPr lang="en-US" altLang="zh-CN" sz="1800" dirty="0">
-                <a:latin typeface="Consolas" panose="020B0609020204030204" pitchFamily="49" charset="0"/>
-              </a:rPr>
+              <a:rPr lang="en-US" altLang="zh-CN" dirty="0"/>
               <a:t>Material From </a:t>
             </a:r>
             <a:r>
-              <a:rPr lang="en-US" altLang="zh-CN" sz="1800" dirty="0" err="1">
-                <a:latin typeface="Consolas" panose="020B0609020204030204" pitchFamily="49" charset="0"/>
-              </a:rPr>
+              <a:rPr lang="en-US" altLang="zh-CN" dirty="0" err="1"/>
               <a:t>Yingjian’s</a:t>
             </a:r>
             <a:r>
-              <a:rPr lang="en-US" altLang="zh-CN" sz="1800" dirty="0">
-                <a:latin typeface="Consolas" panose="020B0609020204030204" pitchFamily="49" charset="0"/>
-              </a:rPr>
+              <a:rPr lang="en-US" altLang="zh-CN" dirty="0"/>
               <a:t> Paper</a:t>
             </a:r>
-            <a:endParaRPr lang="zh-CN" altLang="en-US" sz="1800" dirty="0">
-              <a:latin typeface="Consolas" panose="020B0609020204030204" pitchFamily="49" charset="0"/>
-            </a:endParaRPr>
+            <a:endParaRPr lang="zh-CN" altLang="en-US" dirty="0"/>
           </a:p>
         </p:txBody>
       </p:sp>
@@ -18308,7 +18488,7 @@
         <p:spPr>
           <a:xfrm>
             <a:off x="6564601" y="4524375"/>
-            <a:ext cx="4954068" cy="954107"/>
+            <a:ext cx="4954068" cy="1384995"/>
           </a:xfrm>
           <a:prstGeom prst="rect">
             <a:avLst/>
@@ -18319,26 +18499,44 @@
           <a:bodyPr wrap="square" rtlCol="0">
             <a:spAutoFit/>
           </a:bodyPr>
-          <a:lstStyle/>
-          <a:p>
-            <a:r>
-              <a:rPr lang="zh-CN" altLang="en-US" dirty="0"/>
-              <a:t>原因：</a:t>
-            </a:r>
-            <a:endParaRPr lang="en-US" altLang="zh-CN" dirty="0"/>
-          </a:p>
-          <a:p>
-            <a:r>
-              <a:rPr lang="zh-CN" altLang="en-US" dirty="0"/>
-              <a:t>目前来看，信号特别明显（有特别显著的大峰，和模式），</a:t>
-            </a:r>
+          <a:lstStyle>
+            <a:defPPr marR="0" lvl="0" algn="l" rtl="0">
+              <a:lnSpc>
+                <a:spcPct val="100000"/>
+              </a:lnSpc>
+              <a:spcBef>
+                <a:spcPts val="0"/>
+              </a:spcBef>
+              <a:spcAft>
+                <a:spcPts val="0"/>
+              </a:spcAft>
+              <a:defRPr/>
+            </a:defPPr>
+            <a:lvl1pPr>
+              <a:defRPr sz="1600">
+                <a:solidFill>
+                  <a:schemeClr val="dk1"/>
+                </a:solidFill>
+                <a:latin typeface="Consolas"/>
+              </a:defRPr>
+            </a:lvl1pPr>
+          </a:lstStyle>
+          <a:p>
             <a:r>
               <a:rPr lang="en-US" altLang="zh-CN" dirty="0"/>
-              <a:t>IBI</a:t>
+              <a:t>Reason:</a:t>
             </a:r>
+          </a:p>
+          <a:p>
             <a:r>
-              <a:rPr lang="zh-CN" altLang="en-US" dirty="0"/>
-              <a:t>的计算效果越好，反而是对于模糊不清的信号，会出现不小的问题。</a:t>
+              <a:rPr lang="en-US" altLang="zh-CN" dirty="0"/>
+              <a:t>For signals with particularly prominent patterns or significant patterns, the calculation of IBI works well.</a:t>
+            </a:r>
+          </a:p>
+          <a:p>
+            <a:r>
+              <a:rPr lang="en-US" altLang="zh-CN" dirty="0"/>
+              <a:t>Conversely, for signals unclear or ambiguous, IBI calculation may encounter some issues. These issues and the possible solution will be mentioned later on.</a:t>
             </a:r>
           </a:p>
         </p:txBody>
@@ -18426,12 +18624,258 @@
           </a:p>
         </p:txBody>
       </p:sp>
+      <p:sp>
+        <p:nvSpPr>
+          <p:cNvPr id="6" name="文本框 5">
+            <a:extLst>
+              <a:ext uri="{FF2B5EF4-FFF2-40B4-BE49-F238E27FC236}">
+                <a16:creationId xmlns:a16="http://schemas.microsoft.com/office/drawing/2014/main" id="{72F534C1-1FD5-FEC3-903D-641FD77EF654}"/>
+              </a:ext>
+            </a:extLst>
+          </p:cNvPr>
+          <p:cNvSpPr txBox="1"/>
+          <p:nvPr/>
+        </p:nvSpPr>
+        <p:spPr>
+          <a:xfrm>
+            <a:off x="215718" y="1713404"/>
+            <a:ext cx="5447089" cy="1231106"/>
+          </a:xfrm>
+          <a:prstGeom prst="rect">
+            <a:avLst/>
+          </a:prstGeom>
+          <a:noFill/>
+        </p:spPr>
+        <p:txBody>
+          <a:bodyPr wrap="square" rtlCol="0">
+            <a:spAutoFit/>
+          </a:bodyPr>
+          <a:lstStyle>
+            <a:defPPr marR="0" lvl="0" algn="l" rtl="0">
+              <a:lnSpc>
+                <a:spcPct val="100000"/>
+              </a:lnSpc>
+              <a:spcBef>
+                <a:spcPts val="0"/>
+              </a:spcBef>
+              <a:spcAft>
+                <a:spcPts val="0"/>
+              </a:spcAft>
+            </a:defPPr>
+            <a:lvl1pPr>
+              <a:defRPr sz="1800">
+                <a:solidFill>
+                  <a:schemeClr val="dk1"/>
+                </a:solidFill>
+                <a:latin typeface="Consolas"/>
+              </a:defRPr>
+            </a:lvl1pPr>
+          </a:lstStyle>
+          <a:p>
+            <a:r>
+              <a:rPr lang="en-US" altLang="zh-CN" sz="2000" dirty="0"/>
+              <a:t>Fact</a:t>
+            </a:r>
+            <a:r>
+              <a:rPr lang="zh-CN" altLang="en-US" dirty="0"/>
+              <a:t>：</a:t>
+            </a:r>
+            <a:endParaRPr lang="en-US" altLang="zh-CN" dirty="0"/>
+          </a:p>
+          <a:p>
+            <a:r>
+              <a:rPr lang="en-US" altLang="zh-CN" dirty="0"/>
+              <a:t>Sticky heartbeats are a significant issue. They have a considerable impact on IBI calculations.</a:t>
+            </a:r>
+          </a:p>
+        </p:txBody>
+      </p:sp>
+      <p:sp>
+        <p:nvSpPr>
+          <p:cNvPr id="8" name="文本框 7">
+            <a:extLst>
+              <a:ext uri="{FF2B5EF4-FFF2-40B4-BE49-F238E27FC236}">
+                <a16:creationId xmlns:a16="http://schemas.microsoft.com/office/drawing/2014/main" id="{F0AB3714-71DE-1F60-6468-8A58CDC6790B}"/>
+              </a:ext>
+            </a:extLst>
+          </p:cNvPr>
+          <p:cNvSpPr txBox="1"/>
+          <p:nvPr/>
+        </p:nvSpPr>
+        <p:spPr>
+          <a:xfrm>
+            <a:off x="5880160" y="1713404"/>
+            <a:ext cx="6311840" cy="4862870"/>
+          </a:xfrm>
+          <a:prstGeom prst="rect">
+            <a:avLst/>
+          </a:prstGeom>
+          <a:noFill/>
+        </p:spPr>
+        <p:txBody>
+          <a:bodyPr wrap="square" rtlCol="0">
+            <a:spAutoFit/>
+          </a:bodyPr>
+          <a:lstStyle>
+            <a:defPPr marR="0" lvl="0" algn="l" rtl="0">
+              <a:lnSpc>
+                <a:spcPct val="100000"/>
+              </a:lnSpc>
+              <a:spcBef>
+                <a:spcPts val="0"/>
+              </a:spcBef>
+              <a:spcAft>
+                <a:spcPts val="0"/>
+              </a:spcAft>
+              <a:defRPr/>
+            </a:defPPr>
+            <a:lvl1pPr>
+              <a:defRPr sz="1800">
+                <a:solidFill>
+                  <a:schemeClr val="dk1"/>
+                </a:solidFill>
+                <a:latin typeface="Consolas"/>
+              </a:defRPr>
+            </a:lvl1pPr>
+          </a:lstStyle>
+          <a:p>
+            <a:r>
+              <a:rPr lang="en-US" altLang="zh-CN" sz="2000" dirty="0"/>
+              <a:t>Assumption</a:t>
+            </a:r>
+            <a:r>
+              <a:rPr lang="en-US" altLang="zh-CN" dirty="0"/>
+              <a:t>:</a:t>
+            </a:r>
+          </a:p>
+          <a:p>
+            <a:pPr marL="285750" indent="-285750">
+              <a:buFont typeface="Arial" panose="020B0604020202020204" pitchFamily="34" charset="0"/>
+              <a:buChar char="•"/>
+            </a:pPr>
+            <a:r>
+              <a:rPr lang="en-US" altLang="zh-CN" dirty="0"/>
+              <a:t>In the connection between two heartbeats, the signal values should ideally be close to zero. </a:t>
+            </a:r>
+          </a:p>
+          <a:p>
+            <a:pPr marL="285750" indent="-285750">
+              <a:buFont typeface="Arial" panose="020B0604020202020204" pitchFamily="34" charset="0"/>
+              <a:buChar char="•"/>
+            </a:pPr>
+            <a:r>
+              <a:rPr lang="en-US" altLang="zh-CN" dirty="0"/>
+              <a:t>For signals during heartbeats, there should, in principle, be rich information, exhibiting a wide frequency range.</a:t>
+            </a:r>
+          </a:p>
+          <a:p>
+            <a:endParaRPr lang="en-US" altLang="zh-CN" dirty="0"/>
+          </a:p>
+          <a:p>
+            <a:endParaRPr lang="en-US" altLang="zh-CN" dirty="0"/>
+          </a:p>
+          <a:p>
+            <a:r>
+              <a:rPr lang="en-US" altLang="zh-CN" sz="2000" dirty="0"/>
+              <a:t>Observation</a:t>
+            </a:r>
+            <a:r>
+              <a:rPr lang="en-US" altLang="zh-CN" dirty="0"/>
+              <a:t>:</a:t>
+            </a:r>
+          </a:p>
+          <a:p>
+            <a:r>
+              <a:rPr lang="en-US" altLang="zh-CN" dirty="0"/>
+              <a:t>Most instances of sticky connections are caused by low frequencies. </a:t>
+            </a:r>
+          </a:p>
+          <a:p>
+            <a:endParaRPr lang="en-US" altLang="zh-CN" dirty="0"/>
+          </a:p>
+          <a:p>
+            <a:endParaRPr lang="en-US" altLang="zh-CN" dirty="0"/>
+          </a:p>
+          <a:p>
+            <a:r>
+              <a:rPr lang="en-US" altLang="zh-CN" sz="2000" dirty="0"/>
+              <a:t>Solution</a:t>
+            </a:r>
+            <a:r>
+              <a:rPr lang="en-US" altLang="zh-CN" dirty="0"/>
+              <a:t>:</a:t>
+            </a:r>
+          </a:p>
+          <a:p>
+            <a:r>
+              <a:rPr lang="en-US" altLang="zh-CN" dirty="0"/>
+              <a:t>Eliminating low-frequency signals, only the high-frequency information related to heartbeats is considered.</a:t>
+            </a:r>
+          </a:p>
+        </p:txBody>
+      </p:sp>
+      <p:sp>
+        <p:nvSpPr>
+          <p:cNvPr id="10" name="文本框 9">
+            <a:extLst>
+              <a:ext uri="{FF2B5EF4-FFF2-40B4-BE49-F238E27FC236}">
+                <a16:creationId xmlns:a16="http://schemas.microsoft.com/office/drawing/2014/main" id="{1318C973-9097-31CC-576B-C142288E1B23}"/>
+              </a:ext>
+            </a:extLst>
+          </p:cNvPr>
+          <p:cNvSpPr txBox="1"/>
+          <p:nvPr/>
+        </p:nvSpPr>
+        <p:spPr>
+          <a:xfrm>
+            <a:off x="0" y="457582"/>
+            <a:ext cx="12192000" cy="923330"/>
+          </a:xfrm>
+          <a:prstGeom prst="rect">
+            <a:avLst/>
+          </a:prstGeom>
+          <a:noFill/>
+        </p:spPr>
+        <p:txBody>
+          <a:bodyPr wrap="square" rtlCol="0">
+            <a:spAutoFit/>
+          </a:bodyPr>
+          <a:lstStyle>
+            <a:defPPr marR="0" lvl="0" algn="l" rtl="0">
+              <a:lnSpc>
+                <a:spcPct val="100000"/>
+              </a:lnSpc>
+              <a:spcBef>
+                <a:spcPts val="0"/>
+              </a:spcBef>
+              <a:spcAft>
+                <a:spcPts val="0"/>
+              </a:spcAft>
+              <a:defRPr/>
+            </a:defPPr>
+            <a:lvl1pPr>
+              <a:defRPr sz="1800">
+                <a:solidFill>
+                  <a:schemeClr val="dk1"/>
+                </a:solidFill>
+                <a:latin typeface="Consolas"/>
+              </a:defRPr>
+            </a:lvl1pPr>
+          </a:lstStyle>
+          <a:p>
+            <a:r>
+              <a:rPr lang="en-US" altLang="zh-CN" dirty="0"/>
+              <a:t>Question: In the paper, Song reconstruct signals with frequency ranges spanning 0.8 Hz to 12 Hz. At which frequencies of signals can we clearly observe the heartbeat cycle? Is it necessary to include all information related to heartbeats in the signals?</a:t>
+            </a:r>
+          </a:p>
+        </p:txBody>
+      </p:sp>
       <p:pic>
         <p:nvPicPr>
-          <p:cNvPr id="3" name="图片 2">
+          <p:cNvPr id="11" name="图片 10">
             <a:extLst>
               <a:ext uri="{FF2B5EF4-FFF2-40B4-BE49-F238E27FC236}">
-                <a16:creationId xmlns:a16="http://schemas.microsoft.com/office/drawing/2014/main" id="{5C696D84-2ABB-346E-0C89-68B113E747CD}"/>
+                <a16:creationId xmlns:a16="http://schemas.microsoft.com/office/drawing/2014/main" id="{91989282-4E4D-01E1-12FD-F8DEAC3FF808}"/>
               </a:ext>
             </a:extLst>
           </p:cNvPr>
@@ -18448,107 +18892,14 @@
         </p:blipFill>
         <p:spPr>
           <a:xfrm>
-            <a:off x="133003" y="3524250"/>
-            <a:ext cx="4972744" cy="1057423"/>
+            <a:off x="343338" y="3087295"/>
+            <a:ext cx="5191850" cy="3439005"/>
           </a:xfrm>
           <a:prstGeom prst="rect">
             <a:avLst/>
           </a:prstGeom>
         </p:spPr>
       </p:pic>
-      <p:sp>
-        <p:nvSpPr>
-          <p:cNvPr id="6" name="文本框 5">
-            <a:extLst>
-              <a:ext uri="{FF2B5EF4-FFF2-40B4-BE49-F238E27FC236}">
-                <a16:creationId xmlns:a16="http://schemas.microsoft.com/office/drawing/2014/main" id="{72F534C1-1FD5-FEC3-903D-641FD77EF654}"/>
-              </a:ext>
-            </a:extLst>
-          </p:cNvPr>
-          <p:cNvSpPr txBox="1"/>
-          <p:nvPr/>
-        </p:nvSpPr>
-        <p:spPr>
-          <a:xfrm>
-            <a:off x="257175" y="574000"/>
-            <a:ext cx="9772650" cy="2462213"/>
-          </a:xfrm>
-          <a:prstGeom prst="rect">
-            <a:avLst/>
-          </a:prstGeom>
-          <a:noFill/>
-        </p:spPr>
-        <p:txBody>
-          <a:bodyPr wrap="square" rtlCol="0">
-            <a:spAutoFit/>
-          </a:bodyPr>
-          <a:lstStyle/>
-          <a:p>
-            <a:r>
-              <a:rPr lang="en-US" altLang="zh-CN" dirty="0"/>
-              <a:t>Question: At which frequencies of signals can we observe the heartbeat cycle?</a:t>
-            </a:r>
-          </a:p>
-          <a:p>
-            <a:endParaRPr lang="en-US" altLang="zh-CN" dirty="0"/>
-          </a:p>
-          <a:p>
-            <a:r>
-              <a:rPr lang="zh-CN" altLang="en-US" dirty="0"/>
-              <a:t>一定在低频吗？</a:t>
-            </a:r>
-            <a:endParaRPr lang="en-US" altLang="zh-CN" dirty="0"/>
-          </a:p>
-          <a:p>
-            <a:endParaRPr lang="en-US" altLang="zh-CN" dirty="0"/>
-          </a:p>
-          <a:p>
-            <a:endParaRPr lang="en-US" altLang="zh-CN" dirty="0"/>
-          </a:p>
-          <a:p>
-            <a:r>
-              <a:rPr lang="zh-CN" altLang="en-US" dirty="0"/>
-              <a:t>根据我们的观察：黏连的心跳是一个很大的问题。</a:t>
-            </a:r>
-            <a:endParaRPr lang="en-US" altLang="zh-CN" dirty="0"/>
-          </a:p>
-          <a:p>
-            <a:endParaRPr lang="en-US" altLang="zh-CN" dirty="0"/>
-          </a:p>
-          <a:p>
-            <a:r>
-              <a:rPr lang="zh-CN" altLang="en-US" dirty="0"/>
-              <a:t>但是心跳周期的连接部分，原则上来说应该是接近于</a:t>
-            </a:r>
-            <a:r>
-              <a:rPr lang="en-US" altLang="zh-CN" dirty="0"/>
-              <a:t>0</a:t>
-            </a:r>
-            <a:r>
-              <a:rPr lang="zh-CN" altLang="en-US" dirty="0"/>
-              <a:t>，</a:t>
-            </a:r>
-            <a:endParaRPr lang="en-US" altLang="zh-CN" dirty="0"/>
-          </a:p>
-          <a:p>
-            <a:r>
-              <a:rPr lang="zh-CN" altLang="en-US" dirty="0"/>
-              <a:t>心跳时的信号，原则上信号在非常多的频率，频域的范围会更大。</a:t>
-            </a:r>
-            <a:endParaRPr lang="en-US" altLang="zh-CN" dirty="0"/>
-          </a:p>
-          <a:p>
-            <a:endParaRPr lang="en-US" altLang="zh-CN" dirty="0"/>
-          </a:p>
-          <a:p>
-            <a:r>
-              <a:rPr lang="zh-CN" altLang="en-US" dirty="0"/>
-              <a:t>实际上：观察到大部分造成的黏连情况是低频。去掉低频信号，只看心跳的高频部分。</a:t>
-            </a:r>
-            <a:endParaRPr lang="en-US" altLang="zh-CN" dirty="0"/>
-          </a:p>
-        </p:txBody>
-      </p:sp>
       <p:sp>
         <p:nvSpPr>
           <p:cNvPr id="13" name="矩形 12">
@@ -18563,8 +18914,8 @@
         </p:nvSpPr>
         <p:spPr>
           <a:xfrm>
-            <a:off x="1981200" y="3524250"/>
-            <a:ext cx="142875" cy="1177542"/>
+            <a:off x="2247900" y="3235431"/>
+            <a:ext cx="171103" cy="1030106"/>
           </a:xfrm>
           <a:prstGeom prst="rect">
             <a:avLst/>
@@ -18611,8 +18962,8 @@
         </p:nvSpPr>
         <p:spPr>
           <a:xfrm>
-            <a:off x="2324100" y="3590925"/>
-            <a:ext cx="142875" cy="1177542"/>
+            <a:off x="2581276" y="3234731"/>
+            <a:ext cx="161578" cy="1030106"/>
           </a:xfrm>
           <a:prstGeom prst="rect">
             <a:avLst/>
@@ -18641,7 +18992,7 @@
           <a:lstStyle/>
           <a:p>
             <a:pPr algn="ctr"/>
-            <a:endParaRPr lang="zh-CN" altLang="en-US"/>
+            <a:endParaRPr lang="zh-CN" altLang="en-US" dirty="0"/>
           </a:p>
         </p:txBody>
       </p:sp>
@@ -18659,8 +19010,8 @@
         </p:nvSpPr>
         <p:spPr>
           <a:xfrm>
-            <a:off x="2733675" y="3590925"/>
-            <a:ext cx="142875" cy="1177542"/>
+            <a:off x="3005137" y="3234731"/>
+            <a:ext cx="171103" cy="1030106"/>
           </a:xfrm>
           <a:prstGeom prst="rect">
             <a:avLst/>
@@ -18707,8 +19058,8 @@
         </p:nvSpPr>
         <p:spPr>
           <a:xfrm>
-            <a:off x="3819525" y="3524250"/>
-            <a:ext cx="142875" cy="1177542"/>
+            <a:off x="4086572" y="3234731"/>
+            <a:ext cx="171103" cy="1030106"/>
           </a:xfrm>
           <a:prstGeom prst="rect">
             <a:avLst/>
@@ -18755,8 +19106,8 @@
         </p:nvSpPr>
         <p:spPr>
           <a:xfrm>
-            <a:off x="4229100" y="3524250"/>
-            <a:ext cx="142875" cy="1177542"/>
+            <a:off x="4500909" y="3234731"/>
+            <a:ext cx="171103" cy="1030106"/>
           </a:xfrm>
           <a:prstGeom prst="rect">
             <a:avLst/>
@@ -18976,8 +19327,8 @@
         </p:nvSpPr>
         <p:spPr>
           <a:xfrm>
-            <a:off x="866775" y="4295776"/>
-            <a:ext cx="6219825" cy="738664"/>
+            <a:off x="714375" y="4247707"/>
+            <a:ext cx="6219825" cy="1169551"/>
           </a:xfrm>
           <a:prstGeom prst="rect">
             <a:avLst/>
@@ -19000,19 +19351,19 @@
               <a:buAutoNum type="arabicPeriod"/>
             </a:pPr>
             <a:r>
-              <a:rPr lang="zh-CN" altLang="en-US" dirty="0"/>
-              <a:t>原本的心跳黏连，能被有效区分</a:t>
+              <a:rPr lang="en-US" altLang="zh-CN" dirty="0"/>
+              <a:t>Sticky Heartbeats signals could be identified easily.</a:t>
             </a:r>
-            <a:endParaRPr lang="en-US" altLang="zh-CN" dirty="0"/>
           </a:p>
           <a:p>
             <a:pPr marL="342900" indent="-342900">
               <a:buAutoNum type="arabicPeriod"/>
             </a:pPr>
             <a:r>
-              <a:rPr lang="zh-CN" altLang="en-US" dirty="0"/>
-              <a:t>去掉信号的低频后（低频能量高），反而在能量域上，更加的均匀</a:t>
+              <a:rPr lang="en-US" altLang="zh-CN" dirty="0"/>
+              <a:t>Due to the higher energy content of low-frequency signals, filtering out these signals results in a more uniform and periodic distribution of signal energy.</a:t>
             </a:r>
+            <a:endParaRPr lang="zh-CN" altLang="en-US" dirty="0"/>
           </a:p>
         </p:txBody>
       </p:sp>
@@ -19395,8 +19746,8 @@
         </p:nvSpPr>
         <p:spPr>
           <a:xfrm>
-            <a:off x="990600" y="5324475"/>
-            <a:ext cx="6822641" cy="954107"/>
+            <a:off x="3324225" y="5248275"/>
+            <a:ext cx="8239125" cy="1384995"/>
           </a:xfrm>
           <a:prstGeom prst="rect">
             <a:avLst/>
@@ -19410,13 +19761,9 @@
           <a:lstStyle/>
           <a:p>
             <a:r>
-              <a:rPr lang="zh-CN" altLang="en-US" dirty="0"/>
-              <a:t>把低频信号抽掉了，对包络线进行自回归，就不会出现双峰了。</a:t>
+              <a:rPr lang="en-US" altLang="zh-CN" dirty="0"/>
+              <a:t>After filtering out the low-frequency signals, applying autoregression to the envelope curve prevents the occurrence of bimodal phenomena. Based on observations, 80% of the bimodal phenomena will disappear, while the remaining 20% will significantly diminish, with some remaining at the end.</a:t>
             </a:r>
-            <a:endParaRPr lang="en-US" altLang="zh-CN" dirty="0"/>
-          </a:p>
-          <a:p>
-            <a:endParaRPr lang="en-US" altLang="zh-CN" dirty="0"/>
           </a:p>
           <a:p>
             <a:endParaRPr lang="en-US" altLang="zh-CN" dirty="0"/>
@@ -19424,20 +19771,9 @@
           <a:p>
             <a:r>
               <a:rPr lang="en-US" altLang="zh-CN" dirty="0"/>
-              <a:t>In one word, </a:t>
+              <a:t>In summary, high-frequency signals are effective for HR estimation, but they prevent the meaningful extraction of templates.</a:t>
             </a:r>
-            <a:r>
-              <a:rPr lang="zh-CN" altLang="en-US" dirty="0"/>
-              <a:t>高频信号用于</a:t>
-            </a:r>
-            <a:r>
-              <a:rPr lang="en-US" altLang="zh-CN" dirty="0"/>
-              <a:t>HR Estimation</a:t>
-            </a:r>
-            <a:r>
-              <a:rPr lang="zh-CN" altLang="en-US" dirty="0"/>
-              <a:t>有奇效。</a:t>
-            </a:r>
+            <a:endParaRPr lang="zh-CN" altLang="en-US" dirty="0"/>
           </a:p>
         </p:txBody>
       </p:sp>

</xml_diff>